<commit_message>
Update for Tableau use
</commit_message>
<xml_diff>
--- a/doc/Steam_DA_overview.pptx
+++ b/doc/Steam_DA_overview.pptx
@@ -285,7 +285,7 @@
 <file path=ppt/revisionInfo.xml><?xml version="1.0" encoding="utf-8"?>
 <p1510:revInfo xmlns:a="http://schemas.openxmlformats.org/drawingml/2006/main" xmlns:r="http://schemas.openxmlformats.org/officeDocument/2006/relationships" xmlns:p1510="http://schemas.microsoft.com/office/powerpoint/2015/10/main">
   <p1510:revLst>
-    <p1510:client id="{CCEC738B-A1A2-5744-8BC2-1AE1BCA9DCC4}" v="13" dt="2024-06-17T05:54:44.207"/>
+    <p1510:client id="{C60D05D3-7F6D-4182-AFF4-04BADAE9B601}" v="4" dt="2024-07-11T09:20:45.566"/>
   </p1510:revLst>
 </p1510:revInfo>
 </file>
@@ -295,7 +295,7 @@
   <pc:docChgLst>
     <pc:chgData name="Zeyu Liu" userId="46f723ae19f75f51" providerId="LiveId" clId="{C60D05D3-7F6D-4182-AFF4-04BADAE9B601}"/>
     <pc:docChg chg="undo redo custSel addSld delSld modSld">
-      <pc:chgData name="Zeyu Liu" userId="46f723ae19f75f51" providerId="LiveId" clId="{C60D05D3-7F6D-4182-AFF4-04BADAE9B601}" dt="2024-06-17T12:11:47.436" v="989" actId="20577"/>
+      <pc:chgData name="Zeyu Liu" userId="46f723ae19f75f51" providerId="LiveId" clId="{C60D05D3-7F6D-4182-AFF4-04BADAE9B601}" dt="2024-07-11T09:20:45.566" v="999"/>
       <pc:docMkLst>
         <pc:docMk/>
       </pc:docMkLst>
@@ -1211,8 +1211,8 @@
           </ac:picMkLst>
         </pc:picChg>
       </pc:sldChg>
-      <pc:sldChg chg="addSp delSp modSp add mod">
-        <pc:chgData name="Zeyu Liu" userId="46f723ae19f75f51" providerId="LiveId" clId="{C60D05D3-7F6D-4182-AFF4-04BADAE9B601}" dt="2024-06-17T12:11:47.436" v="989" actId="20577"/>
+      <pc:sldChg chg="addSp delSp modSp add mod modAnim">
+        <pc:chgData name="Zeyu Liu" userId="46f723ae19f75f51" providerId="LiveId" clId="{C60D05D3-7F6D-4182-AFF4-04BADAE9B601}" dt="2024-07-11T09:20:45.566" v="999"/>
         <pc:sldMkLst>
           <pc:docMk/>
           <pc:sldMk cId="1154538717" sldId="267"/>
@@ -1247,6 +1247,14 @@
             <pc:docMk/>
             <pc:sldMk cId="1154538717" sldId="267"/>
             <ac:picMk id="2" creationId="{8A0E86B1-A687-DDF5-B22A-C7B9FEA42FB2}"/>
+          </ac:picMkLst>
+        </pc:picChg>
+        <pc:picChg chg="add mod">
+          <ac:chgData name="Zeyu Liu" userId="46f723ae19f75f51" providerId="LiveId" clId="{C60D05D3-7F6D-4182-AFF4-04BADAE9B601}" dt="2024-07-11T09:20:01.051" v="995" actId="1076"/>
+          <ac:picMkLst>
+            <pc:docMk/>
+            <pc:sldMk cId="1154538717" sldId="267"/>
+            <ac:picMk id="6" creationId="{AC31EF99-C453-9497-50E3-FFC4795B67B8}"/>
           </ac:picMkLst>
         </pc:picChg>
       </pc:sldChg>
@@ -14487,6 +14495,36 @@
           </a:p>
         </p:txBody>
       </p:sp>
+      <p:pic>
+        <p:nvPicPr>
+          <p:cNvPr id="6" name="图片 5">
+            <a:extLst>
+              <a:ext uri="{FF2B5EF4-FFF2-40B4-BE49-F238E27FC236}">
+                <a16:creationId xmlns:a16="http://schemas.microsoft.com/office/drawing/2014/main" id="{AC31EF99-C453-9497-50E3-FFC4795B67B8}"/>
+              </a:ext>
+            </a:extLst>
+          </p:cNvPr>
+          <p:cNvPicPr>
+            <a:picLocks noChangeAspect="1"/>
+          </p:cNvPicPr>
+          <p:nvPr/>
+        </p:nvPicPr>
+        <p:blipFill>
+          <a:blip r:embed="rId3"/>
+          <a:stretch>
+            <a:fillRect/>
+          </a:stretch>
+        </p:blipFill>
+        <p:spPr>
+          <a:xfrm>
+            <a:off x="203200" y="1251356"/>
+            <a:ext cx="4005942" cy="3492292"/>
+          </a:xfrm>
+          <a:prstGeom prst="rect">
+            <a:avLst/>
+          </a:prstGeom>
+        </p:spPr>
+      </p:pic>
     </p:spTree>
     <p:extLst>
       <p:ext uri="{BB962C8B-B14F-4D97-AF65-F5344CB8AC3E}">
@@ -14497,6 +14535,89 @@
   <p:clrMapOvr>
     <a:masterClrMapping/>
   </p:clrMapOvr>
+  <p:timing>
+    <p:tnLst>
+      <p:par>
+        <p:cTn id="1" dur="indefinite" restart="never" nodeType="tmRoot">
+          <p:childTnLst>
+            <p:seq concurrent="1" nextAc="seek">
+              <p:cTn id="2" dur="indefinite" nodeType="mainSeq">
+                <p:childTnLst>
+                  <p:par>
+                    <p:cTn id="3" fill="hold">
+                      <p:stCondLst>
+                        <p:cond delay="indefinite"/>
+                      </p:stCondLst>
+                      <p:childTnLst>
+                        <p:par>
+                          <p:cTn id="4" fill="hold">
+                            <p:stCondLst>
+                              <p:cond delay="0"/>
+                            </p:stCondLst>
+                            <p:childTnLst>
+                              <p:par>
+                                <p:cTn id="5" presetID="10" presetClass="entr" presetSubtype="0" fill="hold" nodeType="clickEffect">
+                                  <p:stCondLst>
+                                    <p:cond delay="0"/>
+                                  </p:stCondLst>
+                                  <p:childTnLst>
+                                    <p:set>
+                                      <p:cBhvr>
+                                        <p:cTn id="6" dur="1" fill="hold">
+                                          <p:stCondLst>
+                                            <p:cond delay="0"/>
+                                          </p:stCondLst>
+                                        </p:cTn>
+                                        <p:tgtEl>
+                                          <p:spTgt spid="6"/>
+                                        </p:tgtEl>
+                                        <p:attrNameLst>
+                                          <p:attrName>style.visibility</p:attrName>
+                                        </p:attrNameLst>
+                                      </p:cBhvr>
+                                      <p:to>
+                                        <p:strVal val="visible"/>
+                                      </p:to>
+                                    </p:set>
+                                    <p:animEffect transition="in" filter="fade">
+                                      <p:cBhvr>
+                                        <p:cTn id="7" dur="500"/>
+                                        <p:tgtEl>
+                                          <p:spTgt spid="6"/>
+                                        </p:tgtEl>
+                                      </p:cBhvr>
+                                    </p:animEffect>
+                                  </p:childTnLst>
+                                </p:cTn>
+                              </p:par>
+                            </p:childTnLst>
+                          </p:cTn>
+                        </p:par>
+                      </p:childTnLst>
+                    </p:cTn>
+                  </p:par>
+                </p:childTnLst>
+              </p:cTn>
+              <p:prevCondLst>
+                <p:cond evt="onPrev" delay="0">
+                  <p:tgtEl>
+                    <p:sldTgt/>
+                  </p:tgtEl>
+                </p:cond>
+              </p:prevCondLst>
+              <p:nextCondLst>
+                <p:cond evt="onNext" delay="0">
+                  <p:tgtEl>
+                    <p:sldTgt/>
+                  </p:tgtEl>
+                </p:cond>
+              </p:nextCondLst>
+            </p:seq>
+          </p:childTnLst>
+        </p:cTn>
+      </p:par>
+    </p:tnLst>
+  </p:timing>
 </p:sld>
 </file>
 

</xml_diff>